<commit_message>
Final Presentation and Script Edit
</commit_message>
<xml_diff>
--- a/Presentation/final presentation v2.pptx
+++ b/Presentation/final presentation v2.pptx
@@ -4,6 +4,9 @@
   <p:sldMasterIdLst>
     <p:sldMasterId id="2147483828" r:id="rId1"/>
   </p:sldMasterIdLst>
+  <p:notesMasterIdLst>
+    <p:notesMasterId r:id="rId12"/>
+  </p:notesMasterIdLst>
   <p:sldIdLst>
     <p:sldId id="256" r:id="rId2"/>
     <p:sldId id="257" r:id="rId3"/>
@@ -20,9 +23,16 @@
   <p:notesSz cx="6858000" cy="9144000"/>
   <p:embeddedFontLst>
     <p:embeddedFont>
-      <p:font typeface="Open Sans Light" pitchFamily="34" charset="0"/>
-      <p:regular r:id="rId12"/>
-      <p:italic r:id="rId13"/>
+      <p:font typeface="Open Sans Light" panose="020B0604020202020204" charset="0"/>
+      <p:regular r:id="rId13"/>
+      <p:italic r:id="rId14"/>
+    </p:embeddedFont>
+    <p:embeddedFont>
+      <p:font typeface="Calibri" panose="020F0502020204030204" pitchFamily="34" charset="0"/>
+      <p:regular r:id="rId15"/>
+      <p:bold r:id="rId16"/>
+      <p:italic r:id="rId17"/>
+      <p:boldItalic r:id="rId18"/>
     </p:embeddedFont>
   </p:embeddedFontLst>
   <p:defaultTextStyle>
@@ -120,7 +130,1152 @@
       </a:defRPr>
     </a:lvl9pPr>
   </p:defaultTextStyle>
+  <p:extLst>
+    <p:ext uri="{EFAFB233-063F-42B5-8137-9DF3F51BA10A}">
+      <p15:sldGuideLst xmlns:p15="http://schemas.microsoft.com/office/powerpoint/2012/main">
+        <p15:guide id="1" orient="horz" pos="2160">
+          <p15:clr>
+            <a:srgbClr val="A4A3A4"/>
+          </p15:clr>
+        </p15:guide>
+        <p15:guide id="2" pos="2880">
+          <p15:clr>
+            <a:srgbClr val="A4A3A4"/>
+          </p15:clr>
+        </p15:guide>
+      </p15:sldGuideLst>
+    </p:ext>
+  </p:extLst>
 </p:presentation>
+</file>
+
+<file path=ppt/notesMasters/notesMaster1.xml><?xml version="1.0" encoding="utf-8"?>
+<p:notesMaster xmlns:a="http://schemas.openxmlformats.org/drawingml/2006/main" xmlns:r="http://schemas.openxmlformats.org/officeDocument/2006/relationships" xmlns:p="http://schemas.openxmlformats.org/presentationml/2006/main">
+  <p:cSld>
+    <p:bg>
+      <p:bgRef idx="1001">
+        <a:schemeClr val="bg1"/>
+      </p:bgRef>
+    </p:bg>
+    <p:spTree>
+      <p:nvGrpSpPr>
+        <p:cNvPr id="1" name=""/>
+        <p:cNvGrpSpPr/>
+        <p:nvPr/>
+      </p:nvGrpSpPr>
+      <p:grpSpPr>
+        <a:xfrm>
+          <a:off x="0" y="0"/>
+          <a:ext cx="0" cy="0"/>
+          <a:chOff x="0" y="0"/>
+          <a:chExt cx="0" cy="0"/>
+        </a:xfrm>
+      </p:grpSpPr>
+      <p:sp>
+        <p:nvSpPr>
+          <p:cNvPr id="2" name="Header Placeholder 1"/>
+          <p:cNvSpPr>
+            <a:spLocks noGrp="1"/>
+          </p:cNvSpPr>
+          <p:nvPr>
+            <p:ph type="hdr" sz="quarter"/>
+          </p:nvPr>
+        </p:nvSpPr>
+        <p:spPr>
+          <a:xfrm>
+            <a:off x="0" y="0"/>
+            <a:ext cx="2971800" cy="458788"/>
+          </a:xfrm>
+          <a:prstGeom prst="rect">
+            <a:avLst/>
+          </a:prstGeom>
+        </p:spPr>
+        <p:txBody>
+          <a:bodyPr vert="horz" lIns="91440" tIns="45720" rIns="91440" bIns="45720" rtlCol="0"/>
+          <a:lstStyle>
+            <a:lvl1pPr algn="l">
+              <a:defRPr sz="1200"/>
+            </a:lvl1pPr>
+          </a:lstStyle>
+          <a:p>
+            <a:endParaRPr lang="en-US"/>
+          </a:p>
+        </p:txBody>
+      </p:sp>
+      <p:sp>
+        <p:nvSpPr>
+          <p:cNvPr id="3" name="Date Placeholder 2"/>
+          <p:cNvSpPr>
+            <a:spLocks noGrp="1"/>
+          </p:cNvSpPr>
+          <p:nvPr>
+            <p:ph type="dt" idx="1"/>
+          </p:nvPr>
+        </p:nvSpPr>
+        <p:spPr>
+          <a:xfrm>
+            <a:off x="3884613" y="0"/>
+            <a:ext cx="2971800" cy="458788"/>
+          </a:xfrm>
+          <a:prstGeom prst="rect">
+            <a:avLst/>
+          </a:prstGeom>
+        </p:spPr>
+        <p:txBody>
+          <a:bodyPr vert="horz" lIns="91440" tIns="45720" rIns="91440" bIns="45720" rtlCol="0"/>
+          <a:lstStyle>
+            <a:lvl1pPr algn="r">
+              <a:defRPr sz="1200"/>
+            </a:lvl1pPr>
+          </a:lstStyle>
+          <a:p>
+            <a:fld id="{F457FFE7-BE64-49FE-BC64-28CBF8F55605}" type="datetimeFigureOut">
+              <a:rPr lang="en-US" smtClean="0"/>
+              <a:t>12/16/2014</a:t>
+            </a:fld>
+            <a:endParaRPr lang="en-US"/>
+          </a:p>
+        </p:txBody>
+      </p:sp>
+      <p:sp>
+        <p:nvSpPr>
+          <p:cNvPr id="4" name="Slide Image Placeholder 3"/>
+          <p:cNvSpPr>
+            <a:spLocks noGrp="1" noRot="1" noChangeAspect="1"/>
+          </p:cNvSpPr>
+          <p:nvPr>
+            <p:ph type="sldImg" idx="2"/>
+          </p:nvPr>
+        </p:nvSpPr>
+        <p:spPr>
+          <a:xfrm>
+            <a:off x="1371600" y="1143000"/>
+            <a:ext cx="4114800" cy="3086100"/>
+          </a:xfrm>
+          <a:prstGeom prst="rect">
+            <a:avLst/>
+          </a:prstGeom>
+          <a:noFill/>
+          <a:ln w="12700">
+            <a:solidFill>
+              <a:prstClr val="black"/>
+            </a:solidFill>
+          </a:ln>
+        </p:spPr>
+        <p:txBody>
+          <a:bodyPr vert="horz" lIns="91440" tIns="45720" rIns="91440" bIns="45720" rtlCol="0" anchor="ctr"/>
+          <a:lstStyle/>
+          <a:p>
+            <a:endParaRPr lang="en-US"/>
+          </a:p>
+        </p:txBody>
+      </p:sp>
+      <p:sp>
+        <p:nvSpPr>
+          <p:cNvPr id="5" name="Notes Placeholder 4"/>
+          <p:cNvSpPr>
+            <a:spLocks noGrp="1"/>
+          </p:cNvSpPr>
+          <p:nvPr>
+            <p:ph type="body" sz="quarter" idx="3"/>
+          </p:nvPr>
+        </p:nvSpPr>
+        <p:spPr>
+          <a:xfrm>
+            <a:off x="685800" y="4400550"/>
+            <a:ext cx="5486400" cy="3600450"/>
+          </a:xfrm>
+          <a:prstGeom prst="rect">
+            <a:avLst/>
+          </a:prstGeom>
+        </p:spPr>
+        <p:txBody>
+          <a:bodyPr vert="horz" lIns="91440" tIns="45720" rIns="91440" bIns="45720" rtlCol="0"/>
+          <a:lstStyle/>
+          <a:p>
+            <a:pPr lvl="0"/>
+            <a:r>
+              <a:rPr lang="en-US" smtClean="0"/>
+              <a:t>Click to edit Master text styles</a:t>
+            </a:r>
+          </a:p>
+          <a:p>
+            <a:pPr lvl="1"/>
+            <a:r>
+              <a:rPr lang="en-US" smtClean="0"/>
+              <a:t>Second level</a:t>
+            </a:r>
+          </a:p>
+          <a:p>
+            <a:pPr lvl="2"/>
+            <a:r>
+              <a:rPr lang="en-US" smtClean="0"/>
+              <a:t>Third level</a:t>
+            </a:r>
+          </a:p>
+          <a:p>
+            <a:pPr lvl="3"/>
+            <a:r>
+              <a:rPr lang="en-US" smtClean="0"/>
+              <a:t>Fourth level</a:t>
+            </a:r>
+          </a:p>
+          <a:p>
+            <a:pPr lvl="4"/>
+            <a:r>
+              <a:rPr lang="en-US" smtClean="0"/>
+              <a:t>Fifth level</a:t>
+            </a:r>
+            <a:endParaRPr lang="en-US"/>
+          </a:p>
+        </p:txBody>
+      </p:sp>
+      <p:sp>
+        <p:nvSpPr>
+          <p:cNvPr id="6" name="Footer Placeholder 5"/>
+          <p:cNvSpPr>
+            <a:spLocks noGrp="1"/>
+          </p:cNvSpPr>
+          <p:nvPr>
+            <p:ph type="ftr" sz="quarter" idx="4"/>
+          </p:nvPr>
+        </p:nvSpPr>
+        <p:spPr>
+          <a:xfrm>
+            <a:off x="0" y="8685213"/>
+            <a:ext cx="2971800" cy="458787"/>
+          </a:xfrm>
+          <a:prstGeom prst="rect">
+            <a:avLst/>
+          </a:prstGeom>
+        </p:spPr>
+        <p:txBody>
+          <a:bodyPr vert="horz" lIns="91440" tIns="45720" rIns="91440" bIns="45720" rtlCol="0" anchor="b"/>
+          <a:lstStyle>
+            <a:lvl1pPr algn="l">
+              <a:defRPr sz="1200"/>
+            </a:lvl1pPr>
+          </a:lstStyle>
+          <a:p>
+            <a:endParaRPr lang="en-US"/>
+          </a:p>
+        </p:txBody>
+      </p:sp>
+      <p:sp>
+        <p:nvSpPr>
+          <p:cNvPr id="7" name="Slide Number Placeholder 6"/>
+          <p:cNvSpPr>
+            <a:spLocks noGrp="1"/>
+          </p:cNvSpPr>
+          <p:nvPr>
+            <p:ph type="sldNum" sz="quarter" idx="5"/>
+          </p:nvPr>
+        </p:nvSpPr>
+        <p:spPr>
+          <a:xfrm>
+            <a:off x="3884613" y="8685213"/>
+            <a:ext cx="2971800" cy="458787"/>
+          </a:xfrm>
+          <a:prstGeom prst="rect">
+            <a:avLst/>
+          </a:prstGeom>
+        </p:spPr>
+        <p:txBody>
+          <a:bodyPr vert="horz" lIns="91440" tIns="45720" rIns="91440" bIns="45720" rtlCol="0" anchor="b"/>
+          <a:lstStyle>
+            <a:lvl1pPr algn="r">
+              <a:defRPr sz="1200"/>
+            </a:lvl1pPr>
+          </a:lstStyle>
+          <a:p>
+            <a:fld id="{0983C317-9BDA-4D06-A08C-4B392E091396}" type="slidenum">
+              <a:rPr lang="en-US" smtClean="0"/>
+              <a:t>‹#›</a:t>
+            </a:fld>
+            <a:endParaRPr lang="en-US"/>
+          </a:p>
+        </p:txBody>
+      </p:sp>
+    </p:spTree>
+    <p:extLst>
+      <p:ext uri="{BB962C8B-B14F-4D97-AF65-F5344CB8AC3E}">
+        <p14:creationId xmlns:p14="http://schemas.microsoft.com/office/powerpoint/2010/main" val="3534228857"/>
+      </p:ext>
+    </p:extLst>
+  </p:cSld>
+  <p:clrMap bg1="lt1" tx1="dk1" bg2="lt2" tx2="dk2" accent1="accent1" accent2="accent2" accent3="accent3" accent4="accent4" accent5="accent5" accent6="accent6" hlink="hlink" folHlink="folHlink"/>
+  <p:notesStyle>
+    <a:lvl1pPr marL="0" algn="l" defTabSz="914400" rtl="0" eaLnBrk="1" latinLnBrk="0" hangingPunct="1">
+      <a:defRPr sz="1200" kern="1200">
+        <a:solidFill>
+          <a:schemeClr val="tx1"/>
+        </a:solidFill>
+        <a:latin typeface="+mn-lt"/>
+        <a:ea typeface="+mn-ea"/>
+        <a:cs typeface="+mn-cs"/>
+      </a:defRPr>
+    </a:lvl1pPr>
+    <a:lvl2pPr marL="457200" algn="l" defTabSz="914400" rtl="0" eaLnBrk="1" latinLnBrk="0" hangingPunct="1">
+      <a:defRPr sz="1200" kern="1200">
+        <a:solidFill>
+          <a:schemeClr val="tx1"/>
+        </a:solidFill>
+        <a:latin typeface="+mn-lt"/>
+        <a:ea typeface="+mn-ea"/>
+        <a:cs typeface="+mn-cs"/>
+      </a:defRPr>
+    </a:lvl2pPr>
+    <a:lvl3pPr marL="914400" algn="l" defTabSz="914400" rtl="0" eaLnBrk="1" latinLnBrk="0" hangingPunct="1">
+      <a:defRPr sz="1200" kern="1200">
+        <a:solidFill>
+          <a:schemeClr val="tx1"/>
+        </a:solidFill>
+        <a:latin typeface="+mn-lt"/>
+        <a:ea typeface="+mn-ea"/>
+        <a:cs typeface="+mn-cs"/>
+      </a:defRPr>
+    </a:lvl3pPr>
+    <a:lvl4pPr marL="1371600" algn="l" defTabSz="914400" rtl="0" eaLnBrk="1" latinLnBrk="0" hangingPunct="1">
+      <a:defRPr sz="1200" kern="1200">
+        <a:solidFill>
+          <a:schemeClr val="tx1"/>
+        </a:solidFill>
+        <a:latin typeface="+mn-lt"/>
+        <a:ea typeface="+mn-ea"/>
+        <a:cs typeface="+mn-cs"/>
+      </a:defRPr>
+    </a:lvl4pPr>
+    <a:lvl5pPr marL="1828800" algn="l" defTabSz="914400" rtl="0" eaLnBrk="1" latinLnBrk="0" hangingPunct="1">
+      <a:defRPr sz="1200" kern="1200">
+        <a:solidFill>
+          <a:schemeClr val="tx1"/>
+        </a:solidFill>
+        <a:latin typeface="+mn-lt"/>
+        <a:ea typeface="+mn-ea"/>
+        <a:cs typeface="+mn-cs"/>
+      </a:defRPr>
+    </a:lvl5pPr>
+    <a:lvl6pPr marL="2286000" algn="l" defTabSz="914400" rtl="0" eaLnBrk="1" latinLnBrk="0" hangingPunct="1">
+      <a:defRPr sz="1200" kern="1200">
+        <a:solidFill>
+          <a:schemeClr val="tx1"/>
+        </a:solidFill>
+        <a:latin typeface="+mn-lt"/>
+        <a:ea typeface="+mn-ea"/>
+        <a:cs typeface="+mn-cs"/>
+      </a:defRPr>
+    </a:lvl6pPr>
+    <a:lvl7pPr marL="2743200" algn="l" defTabSz="914400" rtl="0" eaLnBrk="1" latinLnBrk="0" hangingPunct="1">
+      <a:defRPr sz="1200" kern="1200">
+        <a:solidFill>
+          <a:schemeClr val="tx1"/>
+        </a:solidFill>
+        <a:latin typeface="+mn-lt"/>
+        <a:ea typeface="+mn-ea"/>
+        <a:cs typeface="+mn-cs"/>
+      </a:defRPr>
+    </a:lvl7pPr>
+    <a:lvl8pPr marL="3200400" algn="l" defTabSz="914400" rtl="0" eaLnBrk="1" latinLnBrk="0" hangingPunct="1">
+      <a:defRPr sz="1200" kern="1200">
+        <a:solidFill>
+          <a:schemeClr val="tx1"/>
+        </a:solidFill>
+        <a:latin typeface="+mn-lt"/>
+        <a:ea typeface="+mn-ea"/>
+        <a:cs typeface="+mn-cs"/>
+      </a:defRPr>
+    </a:lvl8pPr>
+    <a:lvl9pPr marL="3657600" algn="l" defTabSz="914400" rtl="0" eaLnBrk="1" latinLnBrk="0" hangingPunct="1">
+      <a:defRPr sz="1200" kern="1200">
+        <a:solidFill>
+          <a:schemeClr val="tx1"/>
+        </a:solidFill>
+        <a:latin typeface="+mn-lt"/>
+        <a:ea typeface="+mn-ea"/>
+        <a:cs typeface="+mn-cs"/>
+      </a:defRPr>
+    </a:lvl9pPr>
+  </p:notesStyle>
+</p:notesMaster>
+</file>
+
+<file path=ppt/notesSlides/notesSlide1.xml><?xml version="1.0" encoding="utf-8"?>
+<p:notes xmlns:a="http://schemas.openxmlformats.org/drawingml/2006/main" xmlns:r="http://schemas.openxmlformats.org/officeDocument/2006/relationships" xmlns:p="http://schemas.openxmlformats.org/presentationml/2006/main">
+  <p:cSld>
+    <p:spTree>
+      <p:nvGrpSpPr>
+        <p:cNvPr id="1" name=""/>
+        <p:cNvGrpSpPr/>
+        <p:nvPr/>
+      </p:nvGrpSpPr>
+      <p:grpSpPr>
+        <a:xfrm>
+          <a:off x="0" y="0"/>
+          <a:ext cx="0" cy="0"/>
+          <a:chOff x="0" y="0"/>
+          <a:chExt cx="0" cy="0"/>
+        </a:xfrm>
+      </p:grpSpPr>
+      <p:sp>
+        <p:nvSpPr>
+          <p:cNvPr id="2" name="Slide Image Placeholder 1"/>
+          <p:cNvSpPr>
+            <a:spLocks noGrp="1" noRot="1" noChangeAspect="1"/>
+          </p:cNvSpPr>
+          <p:nvPr>
+            <p:ph type="sldImg"/>
+          </p:nvPr>
+        </p:nvSpPr>
+        <p:spPr/>
+      </p:sp>
+      <p:sp>
+        <p:nvSpPr>
+          <p:cNvPr id="3" name="Notes Placeholder 2"/>
+          <p:cNvSpPr>
+            <a:spLocks noGrp="1"/>
+          </p:cNvSpPr>
+          <p:nvPr>
+            <p:ph type="body" idx="1"/>
+          </p:nvPr>
+        </p:nvSpPr>
+        <p:spPr/>
+        <p:txBody>
+          <a:bodyPr/>
+          <a:lstStyle/>
+          <a:p>
+            <a:r>
+              <a:rPr lang="en-US" dirty="0" err="1" smtClean="0"/>
+              <a:t>Aperio</a:t>
+            </a:r>
+            <a:r>
+              <a:rPr lang="en-US" dirty="0" smtClean="0"/>
+              <a:t> is a water quality sensor that measures Turbidity, Salinity, and contaminants.</a:t>
+            </a:r>
+            <a:r>
+              <a:rPr lang="en-US" baseline="0" dirty="0" smtClean="0"/>
+              <a:t> </a:t>
+            </a:r>
+            <a:r>
+              <a:rPr lang="en-US" baseline="0" dirty="0" err="1" smtClean="0"/>
+              <a:t>Aperio</a:t>
+            </a:r>
+            <a:r>
+              <a:rPr lang="en-US" baseline="0" dirty="0" smtClean="0"/>
+              <a:t> collects data and passes through a algorithm to generate a purity score on the read-out, a grade on how clean your water is. This purity score is also </a:t>
+            </a:r>
+          </a:p>
+          <a:p>
+            <a:r>
+              <a:rPr lang="en-US" baseline="0" dirty="0" smtClean="0"/>
+              <a:t>Accessible online on the website and our smartphone application. Finally, </a:t>
+            </a:r>
+            <a:r>
+              <a:rPr lang="en-US" baseline="0" dirty="0" err="1" smtClean="0"/>
+              <a:t>Aperio</a:t>
+            </a:r>
+            <a:r>
+              <a:rPr lang="en-US" baseline="0" dirty="0" smtClean="0"/>
+              <a:t> alerts you if your purity score falls below a threshold, through your choice of a readout, SMS, app, and/or email</a:t>
+            </a:r>
+            <a:endParaRPr lang="en-US" dirty="0"/>
+          </a:p>
+        </p:txBody>
+      </p:sp>
+      <p:sp>
+        <p:nvSpPr>
+          <p:cNvPr id="4" name="Slide Number Placeholder 3"/>
+          <p:cNvSpPr>
+            <a:spLocks noGrp="1"/>
+          </p:cNvSpPr>
+          <p:nvPr>
+            <p:ph type="sldNum" sz="quarter" idx="10"/>
+          </p:nvPr>
+        </p:nvSpPr>
+        <p:spPr/>
+        <p:txBody>
+          <a:bodyPr/>
+          <a:lstStyle/>
+          <a:p>
+            <a:fld id="{0983C317-9BDA-4D06-A08C-4B392E091396}" type="slidenum">
+              <a:rPr lang="en-US" smtClean="0"/>
+              <a:t>2</a:t>
+            </a:fld>
+            <a:endParaRPr lang="en-US"/>
+          </a:p>
+        </p:txBody>
+      </p:sp>
+    </p:spTree>
+    <p:extLst>
+      <p:ext uri="{BB962C8B-B14F-4D97-AF65-F5344CB8AC3E}">
+        <p14:creationId xmlns:p14="http://schemas.microsoft.com/office/powerpoint/2010/main" val="4006720410"/>
+      </p:ext>
+    </p:extLst>
+  </p:cSld>
+  <p:clrMapOvr>
+    <a:masterClrMapping/>
+  </p:clrMapOvr>
+</p:notes>
+</file>
+
+<file path=ppt/notesSlides/notesSlide2.xml><?xml version="1.0" encoding="utf-8"?>
+<p:notes xmlns:a="http://schemas.openxmlformats.org/drawingml/2006/main" xmlns:r="http://schemas.openxmlformats.org/officeDocument/2006/relationships" xmlns:p="http://schemas.openxmlformats.org/presentationml/2006/main">
+  <p:cSld>
+    <p:spTree>
+      <p:nvGrpSpPr>
+        <p:cNvPr id="1" name=""/>
+        <p:cNvGrpSpPr/>
+        <p:nvPr/>
+      </p:nvGrpSpPr>
+      <p:grpSpPr>
+        <a:xfrm>
+          <a:off x="0" y="0"/>
+          <a:ext cx="0" cy="0"/>
+          <a:chOff x="0" y="0"/>
+          <a:chExt cx="0" cy="0"/>
+        </a:xfrm>
+      </p:grpSpPr>
+      <p:sp>
+        <p:nvSpPr>
+          <p:cNvPr id="2" name="Slide Image Placeholder 1"/>
+          <p:cNvSpPr>
+            <a:spLocks noGrp="1" noRot="1" noChangeAspect="1"/>
+          </p:cNvSpPr>
+          <p:nvPr>
+            <p:ph type="sldImg"/>
+          </p:nvPr>
+        </p:nvSpPr>
+        <p:spPr/>
+      </p:sp>
+      <p:sp>
+        <p:nvSpPr>
+          <p:cNvPr id="3" name="Notes Placeholder 2"/>
+          <p:cNvSpPr>
+            <a:spLocks noGrp="1"/>
+          </p:cNvSpPr>
+          <p:nvPr>
+            <p:ph type="body" idx="1"/>
+          </p:nvPr>
+        </p:nvSpPr>
+        <p:spPr/>
+        <p:txBody>
+          <a:bodyPr/>
+          <a:lstStyle/>
+          <a:p>
+            <a:r>
+              <a:rPr lang="en-US" dirty="0" smtClean="0"/>
+              <a:t>Our Design Goals</a:t>
+            </a:r>
+            <a:r>
+              <a:rPr lang="en-US" baseline="0" dirty="0" smtClean="0"/>
+              <a:t> include cost effective production, consu</a:t>
+            </a:r>
+            <a:r>
+              <a:rPr lang="en-US" u="sng" baseline="0" dirty="0" smtClean="0"/>
+              <a:t>mer marketability, and device connectivity</a:t>
+            </a:r>
+            <a:endParaRPr lang="en-US" dirty="0"/>
+          </a:p>
+        </p:txBody>
+      </p:sp>
+      <p:sp>
+        <p:nvSpPr>
+          <p:cNvPr id="4" name="Slide Number Placeholder 3"/>
+          <p:cNvSpPr>
+            <a:spLocks noGrp="1"/>
+          </p:cNvSpPr>
+          <p:nvPr>
+            <p:ph type="sldNum" sz="quarter" idx="10"/>
+          </p:nvPr>
+        </p:nvSpPr>
+        <p:spPr/>
+        <p:txBody>
+          <a:bodyPr/>
+          <a:lstStyle/>
+          <a:p>
+            <a:fld id="{0983C317-9BDA-4D06-A08C-4B392E091396}" type="slidenum">
+              <a:rPr lang="en-US" smtClean="0"/>
+              <a:t>3</a:t>
+            </a:fld>
+            <a:endParaRPr lang="en-US"/>
+          </a:p>
+        </p:txBody>
+      </p:sp>
+    </p:spTree>
+    <p:extLst>
+      <p:ext uri="{BB962C8B-B14F-4D97-AF65-F5344CB8AC3E}">
+        <p14:creationId xmlns:p14="http://schemas.microsoft.com/office/powerpoint/2010/main" val="3254647218"/>
+      </p:ext>
+    </p:extLst>
+  </p:cSld>
+  <p:clrMapOvr>
+    <a:masterClrMapping/>
+  </p:clrMapOvr>
+</p:notes>
+</file>
+
+<file path=ppt/notesSlides/notesSlide3.xml><?xml version="1.0" encoding="utf-8"?>
+<p:notes xmlns:a="http://schemas.openxmlformats.org/drawingml/2006/main" xmlns:r="http://schemas.openxmlformats.org/officeDocument/2006/relationships" xmlns:p="http://schemas.openxmlformats.org/presentationml/2006/main">
+  <p:cSld>
+    <p:spTree>
+      <p:nvGrpSpPr>
+        <p:cNvPr id="1" name=""/>
+        <p:cNvGrpSpPr/>
+        <p:nvPr/>
+      </p:nvGrpSpPr>
+      <p:grpSpPr>
+        <a:xfrm>
+          <a:off x="0" y="0"/>
+          <a:ext cx="0" cy="0"/>
+          <a:chOff x="0" y="0"/>
+          <a:chExt cx="0" cy="0"/>
+        </a:xfrm>
+      </p:grpSpPr>
+      <p:sp>
+        <p:nvSpPr>
+          <p:cNvPr id="2" name="Slide Image Placeholder 1"/>
+          <p:cNvSpPr>
+            <a:spLocks noGrp="1" noRot="1" noChangeAspect="1"/>
+          </p:cNvSpPr>
+          <p:nvPr>
+            <p:ph type="sldImg"/>
+          </p:nvPr>
+        </p:nvSpPr>
+        <p:spPr/>
+      </p:sp>
+      <p:sp>
+        <p:nvSpPr>
+          <p:cNvPr id="3" name="Notes Placeholder 2"/>
+          <p:cNvSpPr>
+            <a:spLocks noGrp="1"/>
+          </p:cNvSpPr>
+          <p:nvPr>
+            <p:ph type="body" idx="1"/>
+          </p:nvPr>
+        </p:nvSpPr>
+        <p:spPr/>
+        <p:txBody>
+          <a:bodyPr/>
+          <a:lstStyle/>
+          <a:p>
+            <a:r>
+              <a:rPr lang="en-US" dirty="0" smtClean="0"/>
+              <a:t>Our Target Audience</a:t>
+            </a:r>
+            <a:r>
+              <a:rPr lang="en-US" baseline="0" dirty="0" smtClean="0"/>
+              <a:t> include Young Adults and Parents. We are targeting Young Adults due to the fact that we are of the age of a young adults, they are all of our peers meaning they make up most of our network. Younger People usually</a:t>
+            </a:r>
+          </a:p>
+          <a:p>
+            <a:r>
+              <a:rPr lang="en-US" baseline="0" dirty="0" smtClean="0"/>
+              <a:t>Care more about environmental awareness and </a:t>
+            </a:r>
+            <a:r>
+              <a:rPr lang="en-US" baseline="0" dirty="0" err="1" smtClean="0"/>
+              <a:t>cimate</a:t>
+            </a:r>
+            <a:r>
+              <a:rPr lang="en-US" baseline="0" dirty="0" smtClean="0"/>
+              <a:t> change meaning </a:t>
+            </a:r>
+            <a:r>
+              <a:rPr lang="en-US" baseline="0" dirty="0" err="1" smtClean="0"/>
+              <a:t>Aperio’s</a:t>
+            </a:r>
+            <a:r>
+              <a:rPr lang="en-US" baseline="0" dirty="0" smtClean="0"/>
+              <a:t> effect of increasing water quality due to notifying terrible water quality will resonate with them. Kickstarter is [</a:t>
+            </a:r>
+            <a:r>
+              <a:rPr lang="en-US" baseline="0" dirty="0" err="1" smtClean="0"/>
+              <a:t>rimaarily</a:t>
+            </a:r>
+            <a:r>
+              <a:rPr lang="en-US" baseline="0" dirty="0" smtClean="0"/>
+              <a:t> composed of Young Adults, so for funding</a:t>
+            </a:r>
+          </a:p>
+          <a:p>
+            <a:r>
+              <a:rPr lang="en-US" baseline="0" dirty="0" smtClean="0"/>
+              <a:t>We will need to </a:t>
+            </a:r>
+            <a:r>
+              <a:rPr lang="en-US" baseline="0" dirty="0" err="1" smtClean="0"/>
+              <a:t>obain</a:t>
+            </a:r>
+            <a:r>
+              <a:rPr lang="en-US" baseline="0" dirty="0" smtClean="0"/>
+              <a:t> money from young adults. Finally, young adults are more prevalent on the internet, making it easier to connect with them. We are targeting parents as parents have health concerns for their young children, meaning that a water quality sensor will protect their children. Also, due to the kids, parents have a mindset that causes them to worry a lot more, making the sensor great for them. Also </a:t>
+            </a:r>
+            <a:r>
+              <a:rPr lang="en-US" baseline="0" dirty="0" err="1" smtClean="0"/>
+              <a:t>Aperio</a:t>
+            </a:r>
+            <a:r>
+              <a:rPr lang="en-US" baseline="0" dirty="0" smtClean="0"/>
+              <a:t> will be included in the home appliances retail section, and mostly parents shop there</a:t>
+            </a:r>
+          </a:p>
+        </p:txBody>
+      </p:sp>
+      <p:sp>
+        <p:nvSpPr>
+          <p:cNvPr id="4" name="Slide Number Placeholder 3"/>
+          <p:cNvSpPr>
+            <a:spLocks noGrp="1"/>
+          </p:cNvSpPr>
+          <p:nvPr>
+            <p:ph type="sldNum" sz="quarter" idx="10"/>
+          </p:nvPr>
+        </p:nvSpPr>
+        <p:spPr/>
+        <p:txBody>
+          <a:bodyPr/>
+          <a:lstStyle/>
+          <a:p>
+            <a:fld id="{0983C317-9BDA-4D06-A08C-4B392E091396}" type="slidenum">
+              <a:rPr lang="en-US" smtClean="0"/>
+              <a:t>5</a:t>
+            </a:fld>
+            <a:endParaRPr lang="en-US"/>
+          </a:p>
+        </p:txBody>
+      </p:sp>
+    </p:spTree>
+    <p:extLst>
+      <p:ext uri="{BB962C8B-B14F-4D97-AF65-F5344CB8AC3E}">
+        <p14:creationId xmlns:p14="http://schemas.microsoft.com/office/powerpoint/2010/main" val="4246989872"/>
+      </p:ext>
+    </p:extLst>
+  </p:cSld>
+  <p:clrMapOvr>
+    <a:masterClrMapping/>
+  </p:clrMapOvr>
+</p:notes>
+</file>
+
+<file path=ppt/notesSlides/notesSlide4.xml><?xml version="1.0" encoding="utf-8"?>
+<p:notes xmlns:a="http://schemas.openxmlformats.org/drawingml/2006/main" xmlns:r="http://schemas.openxmlformats.org/officeDocument/2006/relationships" xmlns:p="http://schemas.openxmlformats.org/presentationml/2006/main">
+  <p:cSld>
+    <p:spTree>
+      <p:nvGrpSpPr>
+        <p:cNvPr id="1" name=""/>
+        <p:cNvGrpSpPr/>
+        <p:nvPr/>
+      </p:nvGrpSpPr>
+      <p:grpSpPr>
+        <a:xfrm>
+          <a:off x="0" y="0"/>
+          <a:ext cx="0" cy="0"/>
+          <a:chOff x="0" y="0"/>
+          <a:chExt cx="0" cy="0"/>
+        </a:xfrm>
+      </p:grpSpPr>
+      <p:sp>
+        <p:nvSpPr>
+          <p:cNvPr id="2" name="Slide Image Placeholder 1"/>
+          <p:cNvSpPr>
+            <a:spLocks noGrp="1" noRot="1" noChangeAspect="1"/>
+          </p:cNvSpPr>
+          <p:nvPr>
+            <p:ph type="sldImg"/>
+          </p:nvPr>
+        </p:nvSpPr>
+        <p:spPr/>
+      </p:sp>
+      <p:sp>
+        <p:nvSpPr>
+          <p:cNvPr id="3" name="Notes Placeholder 2"/>
+          <p:cNvSpPr>
+            <a:spLocks noGrp="1"/>
+          </p:cNvSpPr>
+          <p:nvPr>
+            <p:ph type="body" idx="1"/>
+          </p:nvPr>
+        </p:nvSpPr>
+        <p:spPr/>
+        <p:txBody>
+          <a:bodyPr/>
+          <a:lstStyle/>
+          <a:p>
+            <a:r>
+              <a:rPr lang="en-US" dirty="0" smtClean="0"/>
+              <a:t>To acquire data we started up social networking</a:t>
+            </a:r>
+            <a:r>
+              <a:rPr lang="en-US" baseline="0" dirty="0" smtClean="0"/>
+              <a:t> pages, such as </a:t>
+            </a:r>
+            <a:r>
+              <a:rPr lang="en-US" baseline="0" dirty="0" err="1" smtClean="0"/>
+              <a:t>facebook</a:t>
+            </a:r>
+            <a:r>
+              <a:rPr lang="en-US" baseline="0" dirty="0" smtClean="0"/>
+              <a:t> and google plus, and used these pages to attract friends and attempt to get them to disseminate it to their friends. We linked our website to all of our social networking posts to obtain an email list for our questionnaire. This questionnaire was used to gauge interest in our product</a:t>
+            </a:r>
+            <a:endParaRPr lang="en-US" dirty="0"/>
+          </a:p>
+        </p:txBody>
+      </p:sp>
+      <p:sp>
+        <p:nvSpPr>
+          <p:cNvPr id="4" name="Slide Number Placeholder 3"/>
+          <p:cNvSpPr>
+            <a:spLocks noGrp="1"/>
+          </p:cNvSpPr>
+          <p:nvPr>
+            <p:ph type="sldNum" sz="quarter" idx="10"/>
+          </p:nvPr>
+        </p:nvSpPr>
+        <p:spPr/>
+        <p:txBody>
+          <a:bodyPr/>
+          <a:lstStyle/>
+          <a:p>
+            <a:fld id="{0983C317-9BDA-4D06-A08C-4B392E091396}" type="slidenum">
+              <a:rPr lang="en-US" smtClean="0"/>
+              <a:t>6</a:t>
+            </a:fld>
+            <a:endParaRPr lang="en-US"/>
+          </a:p>
+        </p:txBody>
+      </p:sp>
+    </p:spTree>
+    <p:extLst>
+      <p:ext uri="{BB962C8B-B14F-4D97-AF65-F5344CB8AC3E}">
+        <p14:creationId xmlns:p14="http://schemas.microsoft.com/office/powerpoint/2010/main" val="906347782"/>
+      </p:ext>
+    </p:extLst>
+  </p:cSld>
+  <p:clrMapOvr>
+    <a:masterClrMapping/>
+  </p:clrMapOvr>
+</p:notes>
+</file>
+
+<file path=ppt/notesSlides/notesSlide5.xml><?xml version="1.0" encoding="utf-8"?>
+<p:notes xmlns:a="http://schemas.openxmlformats.org/drawingml/2006/main" xmlns:r="http://schemas.openxmlformats.org/officeDocument/2006/relationships" xmlns:p="http://schemas.openxmlformats.org/presentationml/2006/main">
+  <p:cSld>
+    <p:spTree>
+      <p:nvGrpSpPr>
+        <p:cNvPr id="1" name=""/>
+        <p:cNvGrpSpPr/>
+        <p:nvPr/>
+      </p:nvGrpSpPr>
+      <p:grpSpPr>
+        <a:xfrm>
+          <a:off x="0" y="0"/>
+          <a:ext cx="0" cy="0"/>
+          <a:chOff x="0" y="0"/>
+          <a:chExt cx="0" cy="0"/>
+        </a:xfrm>
+      </p:grpSpPr>
+      <p:sp>
+        <p:nvSpPr>
+          <p:cNvPr id="2" name="Slide Image Placeholder 1"/>
+          <p:cNvSpPr>
+            <a:spLocks noGrp="1" noRot="1" noChangeAspect="1"/>
+          </p:cNvSpPr>
+          <p:nvPr>
+            <p:ph type="sldImg"/>
+          </p:nvPr>
+        </p:nvSpPr>
+        <p:spPr/>
+      </p:sp>
+      <p:sp>
+        <p:nvSpPr>
+          <p:cNvPr id="3" name="Notes Placeholder 2"/>
+          <p:cNvSpPr>
+            <a:spLocks noGrp="1"/>
+          </p:cNvSpPr>
+          <p:nvPr>
+            <p:ph type="body" idx="1"/>
+          </p:nvPr>
+        </p:nvSpPr>
+        <p:spPr/>
+        <p:txBody>
+          <a:bodyPr/>
+          <a:lstStyle/>
+          <a:p>
+            <a:r>
+              <a:rPr lang="en-US" dirty="0" smtClean="0"/>
+              <a:t>These Responses detail how</a:t>
+            </a:r>
+            <a:r>
+              <a:rPr lang="en-US" baseline="0" dirty="0" smtClean="0"/>
+              <a:t> worried people are on each contaminant. As you can see, these contaminants each have different levels of concern. </a:t>
+            </a:r>
+            <a:endParaRPr lang="en-US" dirty="0"/>
+          </a:p>
+        </p:txBody>
+      </p:sp>
+      <p:sp>
+        <p:nvSpPr>
+          <p:cNvPr id="4" name="Slide Number Placeholder 3"/>
+          <p:cNvSpPr>
+            <a:spLocks noGrp="1"/>
+          </p:cNvSpPr>
+          <p:nvPr>
+            <p:ph type="sldNum" sz="quarter" idx="10"/>
+          </p:nvPr>
+        </p:nvSpPr>
+        <p:spPr/>
+        <p:txBody>
+          <a:bodyPr/>
+          <a:lstStyle/>
+          <a:p>
+            <a:fld id="{0983C317-9BDA-4D06-A08C-4B392E091396}" type="slidenum">
+              <a:rPr lang="en-US" smtClean="0"/>
+              <a:t>7</a:t>
+            </a:fld>
+            <a:endParaRPr lang="en-US"/>
+          </a:p>
+        </p:txBody>
+      </p:sp>
+    </p:spTree>
+    <p:extLst>
+      <p:ext uri="{BB962C8B-B14F-4D97-AF65-F5344CB8AC3E}">
+        <p14:creationId xmlns:p14="http://schemas.microsoft.com/office/powerpoint/2010/main" val="373856698"/>
+      </p:ext>
+    </p:extLst>
+  </p:cSld>
+  <p:clrMapOvr>
+    <a:masterClrMapping/>
+  </p:clrMapOvr>
+</p:notes>
+</file>
+
+<file path=ppt/notesSlides/notesSlide6.xml><?xml version="1.0" encoding="utf-8"?>
+<p:notes xmlns:a="http://schemas.openxmlformats.org/drawingml/2006/main" xmlns:r="http://schemas.openxmlformats.org/officeDocument/2006/relationships" xmlns:p="http://schemas.openxmlformats.org/presentationml/2006/main">
+  <p:cSld>
+    <p:spTree>
+      <p:nvGrpSpPr>
+        <p:cNvPr id="1" name=""/>
+        <p:cNvGrpSpPr/>
+        <p:nvPr/>
+      </p:nvGrpSpPr>
+      <p:grpSpPr>
+        <a:xfrm>
+          <a:off x="0" y="0"/>
+          <a:ext cx="0" cy="0"/>
+          <a:chOff x="0" y="0"/>
+          <a:chExt cx="0" cy="0"/>
+        </a:xfrm>
+      </p:grpSpPr>
+      <p:sp>
+        <p:nvSpPr>
+          <p:cNvPr id="2" name="Slide Image Placeholder 1"/>
+          <p:cNvSpPr>
+            <a:spLocks noGrp="1" noRot="1" noChangeAspect="1"/>
+          </p:cNvSpPr>
+          <p:nvPr>
+            <p:ph type="sldImg"/>
+          </p:nvPr>
+        </p:nvSpPr>
+        <p:spPr/>
+      </p:sp>
+      <p:sp>
+        <p:nvSpPr>
+          <p:cNvPr id="3" name="Notes Placeholder 2"/>
+          <p:cNvSpPr>
+            <a:spLocks noGrp="1"/>
+          </p:cNvSpPr>
+          <p:nvPr>
+            <p:ph type="body" idx="1"/>
+          </p:nvPr>
+        </p:nvSpPr>
+        <p:spPr/>
+        <p:txBody>
+          <a:bodyPr/>
+          <a:lstStyle/>
+          <a:p>
+            <a:r>
+              <a:rPr lang="en-US" dirty="0" smtClean="0"/>
+              <a:t>Many</a:t>
+            </a:r>
+            <a:r>
+              <a:rPr lang="en-US" baseline="0" dirty="0" smtClean="0"/>
+              <a:t> of the responses desired that we were to only sell an add-on rather than a full faucet, as it seems many are content with their existing faucets. Also, many expressed distaste with the product as they wondered why buy </a:t>
+            </a:r>
+            <a:r>
+              <a:rPr lang="en-US" baseline="0" dirty="0" err="1" smtClean="0"/>
+              <a:t>Aperio</a:t>
+            </a:r>
+            <a:r>
+              <a:rPr lang="en-US" baseline="0" dirty="0" smtClean="0"/>
+              <a:t> if you can</a:t>
+            </a:r>
+          </a:p>
+          <a:p>
+            <a:r>
+              <a:rPr lang="en-US" baseline="0" dirty="0" smtClean="0"/>
+              <a:t>Just buy a filter. ‘A filter does not give information, and information can be used to take preventative steps. One response that seems to be irreversible is that many people have confidence in their water utilities, requiring no need for </a:t>
+            </a:r>
+            <a:r>
+              <a:rPr lang="en-US" baseline="0" dirty="0" err="1" smtClean="0"/>
+              <a:t>Aperio</a:t>
+            </a:r>
+            <a:r>
+              <a:rPr lang="en-US" baseline="0" dirty="0" smtClean="0"/>
+              <a:t>. Lastly, if the product is relatively cheap it would be bought by many, as without a track record, the product is not one that is enviable. </a:t>
+            </a:r>
+            <a:endParaRPr lang="en-US" dirty="0"/>
+          </a:p>
+        </p:txBody>
+      </p:sp>
+      <p:sp>
+        <p:nvSpPr>
+          <p:cNvPr id="4" name="Slide Number Placeholder 3"/>
+          <p:cNvSpPr>
+            <a:spLocks noGrp="1"/>
+          </p:cNvSpPr>
+          <p:nvPr>
+            <p:ph type="sldNum" sz="quarter" idx="10"/>
+          </p:nvPr>
+        </p:nvSpPr>
+        <p:spPr/>
+        <p:txBody>
+          <a:bodyPr/>
+          <a:lstStyle/>
+          <a:p>
+            <a:fld id="{0983C317-9BDA-4D06-A08C-4B392E091396}" type="slidenum">
+              <a:rPr lang="en-US" smtClean="0"/>
+              <a:t>8</a:t>
+            </a:fld>
+            <a:endParaRPr lang="en-US"/>
+          </a:p>
+        </p:txBody>
+      </p:sp>
+    </p:spTree>
+    <p:extLst>
+      <p:ext uri="{BB962C8B-B14F-4D97-AF65-F5344CB8AC3E}">
+        <p14:creationId xmlns:p14="http://schemas.microsoft.com/office/powerpoint/2010/main" val="402385851"/>
+      </p:ext>
+    </p:extLst>
+  </p:cSld>
+  <p:clrMapOvr>
+    <a:masterClrMapping/>
+  </p:clrMapOvr>
+</p:notes>
+</file>
+
+<file path=ppt/notesSlides/notesSlide7.xml><?xml version="1.0" encoding="utf-8"?>
+<p:notes xmlns:a="http://schemas.openxmlformats.org/drawingml/2006/main" xmlns:r="http://schemas.openxmlformats.org/officeDocument/2006/relationships" xmlns:p="http://schemas.openxmlformats.org/presentationml/2006/main">
+  <p:cSld>
+    <p:spTree>
+      <p:nvGrpSpPr>
+        <p:cNvPr id="1" name=""/>
+        <p:cNvGrpSpPr/>
+        <p:nvPr/>
+      </p:nvGrpSpPr>
+      <p:grpSpPr>
+        <a:xfrm>
+          <a:off x="0" y="0"/>
+          <a:ext cx="0" cy="0"/>
+          <a:chOff x="0" y="0"/>
+          <a:chExt cx="0" cy="0"/>
+        </a:xfrm>
+      </p:grpSpPr>
+      <p:sp>
+        <p:nvSpPr>
+          <p:cNvPr id="2" name="Slide Image Placeholder 1"/>
+          <p:cNvSpPr>
+            <a:spLocks noGrp="1" noRot="1" noChangeAspect="1"/>
+          </p:cNvSpPr>
+          <p:nvPr>
+            <p:ph type="sldImg"/>
+          </p:nvPr>
+        </p:nvSpPr>
+        <p:spPr/>
+      </p:sp>
+      <p:sp>
+        <p:nvSpPr>
+          <p:cNvPr id="3" name="Notes Placeholder 2"/>
+          <p:cNvSpPr>
+            <a:spLocks noGrp="1"/>
+          </p:cNvSpPr>
+          <p:nvPr>
+            <p:ph type="body" idx="1"/>
+          </p:nvPr>
+        </p:nvSpPr>
+        <p:spPr/>
+        <p:txBody>
+          <a:bodyPr/>
+          <a:lstStyle/>
+          <a:p>
+            <a:r>
+              <a:rPr lang="en-US" dirty="0" smtClean="0"/>
+              <a:t>Using</a:t>
+            </a:r>
+            <a:r>
+              <a:rPr lang="en-US" baseline="0" dirty="0" smtClean="0"/>
+              <a:t> the data given, we have decided to make these changes to our design and marketing plan. As the add-on appears to be more popular than the faucet, the </a:t>
+            </a:r>
+            <a:r>
+              <a:rPr lang="en-US" baseline="0" dirty="0" err="1" smtClean="0"/>
+              <a:t>Aperio</a:t>
+            </a:r>
+            <a:r>
+              <a:rPr lang="en-US" baseline="0" dirty="0" smtClean="0"/>
+              <a:t> micro might end up being our flagship product. Also, </a:t>
+            </a:r>
+            <a:r>
+              <a:rPr lang="en-US" baseline="0" dirty="0" err="1" smtClean="0"/>
+              <a:t>adter</a:t>
+            </a:r>
+            <a:r>
+              <a:rPr lang="en-US" baseline="0" dirty="0" smtClean="0"/>
+              <a:t> evaluating the responses on how worried you are for the contaminant, we can simply prioritize which sensors to include in the product based upon which contaminant people were most worried for. As most people have confidence in their water utilities, to get these people to buy our product, we will need to focus on having </a:t>
+            </a:r>
+            <a:r>
+              <a:rPr lang="en-US" baseline="0" dirty="0" err="1" smtClean="0"/>
+              <a:t>Aperio</a:t>
+            </a:r>
+            <a:r>
+              <a:rPr lang="en-US" baseline="0" dirty="0" smtClean="0"/>
+              <a:t> outperform these water utilities. Also, the product must be cost-efficient to be as cheap as possible when it goes live. Finally, as people have truly indicated that they are worried about their water through the survey, this project is one that we wish to continue!</a:t>
+            </a:r>
+            <a:endParaRPr lang="en-US" dirty="0"/>
+          </a:p>
+        </p:txBody>
+      </p:sp>
+      <p:sp>
+        <p:nvSpPr>
+          <p:cNvPr id="4" name="Slide Number Placeholder 3"/>
+          <p:cNvSpPr>
+            <a:spLocks noGrp="1"/>
+          </p:cNvSpPr>
+          <p:nvPr>
+            <p:ph type="sldNum" sz="quarter" idx="10"/>
+          </p:nvPr>
+        </p:nvSpPr>
+        <p:spPr/>
+        <p:txBody>
+          <a:bodyPr/>
+          <a:lstStyle/>
+          <a:p>
+            <a:fld id="{0983C317-9BDA-4D06-A08C-4B392E091396}" type="slidenum">
+              <a:rPr lang="en-US" smtClean="0"/>
+              <a:t>9</a:t>
+            </a:fld>
+            <a:endParaRPr lang="en-US"/>
+          </a:p>
+        </p:txBody>
+      </p:sp>
+    </p:spTree>
+    <p:extLst>
+      <p:ext uri="{BB962C8B-B14F-4D97-AF65-F5344CB8AC3E}">
+        <p14:creationId xmlns:p14="http://schemas.microsoft.com/office/powerpoint/2010/main" val="675026650"/>
+      </p:ext>
+    </p:extLst>
+  </p:cSld>
+  <p:clrMapOvr>
+    <a:masterClrMapping/>
+  </p:clrMapOvr>
+</p:notes>
 </file>
 
 <file path=ppt/slideLayouts/slideLayout1.xml><?xml version="1.0" encoding="utf-8"?>
@@ -3147,6 +4302,46 @@
           </a:prstGeom>
         </p:spPr>
       </p:pic>
+      <p:sp>
+        <p:nvSpPr>
+          <p:cNvPr id="2" name="Oval 1"/>
+          <p:cNvSpPr/>
+          <p:nvPr/>
+        </p:nvSpPr>
+        <p:spPr>
+          <a:xfrm>
+            <a:off x="8839200" y="228600"/>
+            <a:ext cx="152400" cy="152400"/>
+          </a:xfrm>
+          <a:prstGeom prst="ellipse">
+            <a:avLst/>
+          </a:prstGeom>
+        </p:spPr>
+        <p:style>
+          <a:lnRef idx="2">
+            <a:schemeClr val="accent1">
+              <a:shade val="50000"/>
+            </a:schemeClr>
+          </a:lnRef>
+          <a:fillRef idx="1">
+            <a:schemeClr val="accent1"/>
+          </a:fillRef>
+          <a:effectRef idx="0">
+            <a:schemeClr val="accent1"/>
+          </a:effectRef>
+          <a:fontRef idx="minor">
+            <a:schemeClr val="lt1"/>
+          </a:fontRef>
+        </p:style>
+        <p:txBody>
+          <a:bodyPr rtlCol="0" anchor="ctr"/>
+          <a:lstStyle/>
+          <a:p>
+            <a:pPr algn="ctr"/>
+            <a:endParaRPr lang="en-US"/>
+          </a:p>
+        </p:txBody>
+      </p:sp>
     </p:spTree>
     <p:extLst>
       <p:ext uri="{BB962C8B-B14F-4D97-AF65-F5344CB8AC3E}">
@@ -3207,50 +4402,122 @@
           <a:lstStyle/>
           <a:p>
             <a:r>
-              <a:rPr lang="en-US" sz="4000" dirty="0" smtClean="0"/>
+              <a:rPr lang="en-US" sz="4000" dirty="0" smtClean="0">
+                <a:latin typeface="+mn-lt"/>
+              </a:rPr>
               <a:t>Visit us at</a:t>
             </a:r>
             <a:r>
-              <a:rPr lang="en-US" sz="6000" dirty="0" smtClean="0"/>
+              <a:rPr lang="en-US" sz="6000" dirty="0" smtClean="0">
+                <a:latin typeface="+mn-lt"/>
+              </a:rPr>
               <a:t/>
             </a:r>
             <a:br>
-              <a:rPr lang="en-US" sz="6000" dirty="0" smtClean="0"/>
+              <a:rPr lang="en-US" sz="6000" dirty="0" smtClean="0">
+                <a:latin typeface="+mn-lt"/>
+              </a:rPr>
             </a:br>
             <a:r>
-              <a:rPr lang="en-US" sz="10000" dirty="0" smtClean="0"/>
+              <a:rPr lang="en-US" sz="8000" dirty="0" smtClean="0">
+                <a:latin typeface="+mn-lt"/>
+              </a:rPr>
               <a:t>aperiofaucet.net</a:t>
             </a:r>
+            <a:r>
+              <a:rPr lang="en-US" sz="10000" dirty="0" smtClean="0">
+                <a:latin typeface="+mn-lt"/>
+              </a:rPr>
+              <a:t/>
+            </a:r>
             <a:br>
-              <a:rPr lang="en-US" sz="10000" dirty="0" smtClean="0"/>
+              <a:rPr lang="en-US" sz="10000" dirty="0" smtClean="0">
+                <a:latin typeface="+mn-lt"/>
+              </a:rPr>
             </a:br>
             <a:r>
-              <a:rPr lang="en-US" sz="2400" dirty="0" smtClean="0"/>
+              <a:rPr lang="en-US" sz="2000" dirty="0" smtClean="0">
+                <a:latin typeface="+mn-lt"/>
+              </a:rPr>
               <a:t>github.com/mdiamond14/</a:t>
             </a:r>
             <a:r>
-              <a:rPr lang="en-US" sz="2400" dirty="0" err="1" smtClean="0"/>
+              <a:rPr lang="en-US" sz="2000" dirty="0" err="1" smtClean="0">
+                <a:latin typeface="+mn-lt"/>
+              </a:rPr>
               <a:t>Aperio</a:t>
             </a:r>
             <a:r>
-              <a:rPr lang="en-US" sz="2400" dirty="0" smtClean="0"/>
+              <a:rPr lang="en-US" sz="2000" dirty="0" smtClean="0">
+                <a:latin typeface="+mn-lt"/>
+              </a:rPr>
               <a:t>/</a:t>
             </a:r>
             <a:br>
-              <a:rPr lang="en-US" sz="2400" dirty="0" smtClean="0"/>
+              <a:rPr lang="en-US" sz="2000" dirty="0" smtClean="0">
+                <a:latin typeface="+mn-lt"/>
+              </a:rPr>
             </a:br>
             <a:r>
-              <a:rPr lang="en-US" sz="2400" dirty="0" smtClean="0"/>
+              <a:rPr lang="en-US" sz="2000" dirty="0" smtClean="0">
+                <a:latin typeface="+mn-lt"/>
+              </a:rPr>
               <a:t>kickstarter.com/projects/545246334/844326656?token=9b80a16d</a:t>
             </a:r>
             <a:r>
-              <a:rPr lang="en-US" sz="3200" dirty="0" smtClean="0"/>
+              <a:rPr lang="en-US" sz="3200" dirty="0" smtClean="0">
+                <a:latin typeface="+mn-lt"/>
+              </a:rPr>
               <a:t/>
             </a:r>
             <a:br>
-              <a:rPr lang="en-US" sz="3200" dirty="0" smtClean="0"/>
+              <a:rPr lang="en-US" sz="3200" dirty="0" smtClean="0">
+                <a:latin typeface="+mn-lt"/>
+              </a:rPr>
             </a:br>
-            <a:endParaRPr lang="en-US" sz="3200" dirty="0"/>
+            <a:endParaRPr lang="en-US" sz="3200" dirty="0">
+              <a:latin typeface="+mn-lt"/>
+            </a:endParaRPr>
+          </a:p>
+        </p:txBody>
+      </p:sp>
+      <p:sp>
+        <p:nvSpPr>
+          <p:cNvPr id="3" name="Oval 2"/>
+          <p:cNvSpPr/>
+          <p:nvPr/>
+        </p:nvSpPr>
+        <p:spPr>
+          <a:xfrm>
+            <a:off x="8763000" y="533400"/>
+            <a:ext cx="228600" cy="228600"/>
+          </a:xfrm>
+          <a:prstGeom prst="ellipse">
+            <a:avLst/>
+          </a:prstGeom>
+        </p:spPr>
+        <p:style>
+          <a:lnRef idx="2">
+            <a:schemeClr val="accent1">
+              <a:shade val="50000"/>
+            </a:schemeClr>
+          </a:lnRef>
+          <a:fillRef idx="1">
+            <a:schemeClr val="accent1"/>
+          </a:fillRef>
+          <a:effectRef idx="0">
+            <a:schemeClr val="accent1"/>
+          </a:effectRef>
+          <a:fontRef idx="minor">
+            <a:schemeClr val="lt1"/>
+          </a:fontRef>
+        </p:style>
+        <p:txBody>
+          <a:bodyPr rtlCol="0" anchor="ctr"/>
+          <a:lstStyle/>
+          <a:p>
+            <a:pPr algn="ctr"/>
+            <a:endParaRPr lang="en-US"/>
           </a:p>
         </p:txBody>
       </p:sp>
@@ -3309,18 +4576,26 @@
           <a:lstStyle/>
           <a:p>
             <a:r>
-              <a:rPr lang="en-US" sz="6000" dirty="0" smtClean="0"/>
+              <a:rPr lang="en-US" sz="6000" dirty="0" smtClean="0">
+                <a:latin typeface="+mn-lt"/>
+              </a:rPr>
               <a:t>What Is </a:t>
             </a:r>
             <a:r>
-              <a:rPr lang="en-US" sz="6000" dirty="0" err="1" smtClean="0"/>
+              <a:rPr lang="en-US" sz="6000" dirty="0" err="1" smtClean="0">
+                <a:latin typeface="+mn-lt"/>
+              </a:rPr>
               <a:t>Aperio</a:t>
             </a:r>
             <a:r>
-              <a:rPr lang="en-US" sz="6000" dirty="0" smtClean="0"/>
+              <a:rPr lang="en-US" sz="6000" dirty="0" smtClean="0">
+                <a:latin typeface="+mn-lt"/>
+              </a:rPr>
               <a:t>?</a:t>
             </a:r>
-            <a:endParaRPr lang="en-US" sz="6000" dirty="0"/>
+            <a:endParaRPr lang="en-US" sz="6000" dirty="0">
+              <a:latin typeface="+mn-lt"/>
+            </a:endParaRPr>
           </a:p>
         </p:txBody>
       </p:sp>
@@ -3357,27 +4632,62 @@
           <a:p>
             <a:r>
               <a:rPr lang="en-US" sz="4000" dirty="0" smtClean="0"/>
-              <a:t>“Purity Score” algorithm</a:t>
-            </a:r>
-          </a:p>
-          <a:p>
-            <a:pPr lvl="1"/>
-            <a:r>
-              <a:rPr lang="en-US" sz="3600" dirty="0" smtClean="0"/>
-              <a:t>Accessible online</a:t>
-            </a:r>
+              <a:t>Purity Score</a:t>
+            </a:r>
+            <a:endParaRPr lang="en-US" sz="3600" dirty="0" smtClean="0"/>
           </a:p>
           <a:p>
             <a:r>
               <a:rPr lang="en-US" sz="4000" dirty="0" smtClean="0"/>
-              <a:t>Alerts (Readout, SMS, app, email) </a:t>
-            </a:r>
+              <a:t>Alerts </a:t>
+            </a:r>
+            <a:endParaRPr lang="en-US" sz="4000" dirty="0" smtClean="0"/>
           </a:p>
           <a:p>
             <a:endParaRPr lang="en-US" dirty="0" smtClean="0"/>
           </a:p>
           <a:p>
             <a:endParaRPr lang="en-US" dirty="0"/>
+          </a:p>
+        </p:txBody>
+      </p:sp>
+      <p:sp>
+        <p:nvSpPr>
+          <p:cNvPr id="4" name="Rectangle 3"/>
+          <p:cNvSpPr/>
+          <p:nvPr/>
+        </p:nvSpPr>
+        <p:spPr>
+          <a:xfrm>
+            <a:off x="8915400" y="92076"/>
+            <a:ext cx="152400" cy="182562"/>
+          </a:xfrm>
+          <a:prstGeom prst="rect">
+            <a:avLst/>
+          </a:prstGeom>
+        </p:spPr>
+        <p:style>
+          <a:lnRef idx="2">
+            <a:schemeClr val="dk1">
+              <a:shade val="50000"/>
+            </a:schemeClr>
+          </a:lnRef>
+          <a:fillRef idx="1">
+            <a:schemeClr val="dk1"/>
+          </a:fillRef>
+          <a:effectRef idx="0">
+            <a:schemeClr val="dk1"/>
+          </a:effectRef>
+          <a:fontRef idx="minor">
+            <a:schemeClr val="lt1"/>
+          </a:fontRef>
+        </p:style>
+        <p:txBody>
+          <a:bodyPr rtlCol="0" anchor="ctr"/>
+          <a:lstStyle/>
+          <a:p>
+            <a:pPr algn="ctr"/>
+            <a:endParaRPr lang="en-US"/>
           </a:p>
         </p:txBody>
       </p:sp>
@@ -3436,10 +4746,14 @@
           <a:lstStyle/>
           <a:p>
             <a:r>
-              <a:rPr lang="en-US" sz="6000" dirty="0" smtClean="0"/>
+              <a:rPr lang="en-US" sz="6000" dirty="0" smtClean="0">
+                <a:latin typeface="+mn-lt"/>
+              </a:rPr>
               <a:t>Design Goals</a:t>
             </a:r>
-            <a:endParaRPr lang="en-US" sz="6000" dirty="0"/>
+            <a:endParaRPr lang="en-US" sz="6000" dirty="0">
+              <a:latin typeface="+mn-lt"/>
+            </a:endParaRPr>
           </a:p>
         </p:txBody>
       </p:sp>
@@ -3482,6 +4796,46 @@
           </a:p>
           <a:p>
             <a:endParaRPr lang="en-US" sz="5400" dirty="0"/>
+          </a:p>
+        </p:txBody>
+      </p:sp>
+      <p:sp>
+        <p:nvSpPr>
+          <p:cNvPr id="4" name="Rectangle 3"/>
+          <p:cNvSpPr/>
+          <p:nvPr/>
+        </p:nvSpPr>
+        <p:spPr>
+          <a:xfrm>
+            <a:off x="8686800" y="246063"/>
+            <a:ext cx="228600" cy="211137"/>
+          </a:xfrm>
+          <a:prstGeom prst="rect">
+            <a:avLst/>
+          </a:prstGeom>
+        </p:spPr>
+        <p:style>
+          <a:lnRef idx="2">
+            <a:schemeClr val="dk1">
+              <a:shade val="50000"/>
+            </a:schemeClr>
+          </a:lnRef>
+          <a:fillRef idx="1">
+            <a:schemeClr val="dk1"/>
+          </a:fillRef>
+          <a:effectRef idx="0">
+            <a:schemeClr val="dk1"/>
+          </a:effectRef>
+          <a:fontRef idx="minor">
+            <a:schemeClr val="lt1"/>
+          </a:fontRef>
+        </p:style>
+        <p:txBody>
+          <a:bodyPr rtlCol="0" anchor="ctr"/>
+          <a:lstStyle/>
+          <a:p>
+            <a:pPr algn="ctr"/>
+            <a:endParaRPr lang="en-US"/>
           </a:p>
         </p:txBody>
       </p:sp>
@@ -3540,10 +4894,14 @@
           <a:lstStyle/>
           <a:p>
             <a:r>
-              <a:rPr lang="en-US" sz="6000" dirty="0" smtClean="0"/>
+              <a:rPr lang="en-US" sz="6000" dirty="0" smtClean="0">
+                <a:latin typeface="+mn-lt"/>
+              </a:rPr>
               <a:t>Current Prototype</a:t>
             </a:r>
-            <a:endParaRPr lang="en-US" sz="6000" dirty="0"/>
+            <a:endParaRPr lang="en-US" sz="6000" dirty="0">
+              <a:latin typeface="+mn-lt"/>
+            </a:endParaRPr>
           </a:p>
         </p:txBody>
       </p:sp>
@@ -3579,6 +4937,46 @@
           </a:ln>
         </p:spPr>
       </p:pic>
+      <p:sp>
+        <p:nvSpPr>
+          <p:cNvPr id="4" name="Oval 3"/>
+          <p:cNvSpPr/>
+          <p:nvPr/>
+        </p:nvSpPr>
+        <p:spPr>
+          <a:xfrm>
+            <a:off x="8763000" y="146844"/>
+            <a:ext cx="228600" cy="234156"/>
+          </a:xfrm>
+          <a:prstGeom prst="ellipse">
+            <a:avLst/>
+          </a:prstGeom>
+        </p:spPr>
+        <p:style>
+          <a:lnRef idx="2">
+            <a:schemeClr val="accent1">
+              <a:shade val="50000"/>
+            </a:schemeClr>
+          </a:lnRef>
+          <a:fillRef idx="1">
+            <a:schemeClr val="accent1"/>
+          </a:fillRef>
+          <a:effectRef idx="0">
+            <a:schemeClr val="accent1"/>
+          </a:effectRef>
+          <a:fontRef idx="minor">
+            <a:schemeClr val="lt1"/>
+          </a:fontRef>
+        </p:style>
+        <p:txBody>
+          <a:bodyPr rtlCol="0" anchor="ctr"/>
+          <a:lstStyle/>
+          <a:p>
+            <a:pPr algn="ctr"/>
+            <a:endParaRPr lang="en-US"/>
+          </a:p>
+        </p:txBody>
+      </p:sp>
     </p:spTree>
     <p:extLst>
       <p:ext uri="{BB962C8B-B14F-4D97-AF65-F5344CB8AC3E}">
@@ -3634,10 +5032,14 @@
           <a:lstStyle/>
           <a:p>
             <a:r>
-              <a:rPr lang="en-US" sz="6000" dirty="0" smtClean="0"/>
+              <a:rPr lang="en-US" sz="6000" dirty="0" smtClean="0">
+                <a:latin typeface="+mn-lt"/>
+              </a:rPr>
               <a:t>Target Audience</a:t>
             </a:r>
-            <a:endParaRPr lang="en-US" sz="6000" dirty="0"/>
+            <a:endParaRPr lang="en-US" sz="6000" dirty="0">
+              <a:latin typeface="+mn-lt"/>
+            </a:endParaRPr>
           </a:p>
         </p:txBody>
       </p:sp>
@@ -3686,26 +5088,37 @@
           <a:p>
             <a:r>
               <a:rPr lang="en-US" sz="2800" dirty="0" smtClean="0"/>
-              <a:t>Immediately accessible network</a:t>
-            </a:r>
-          </a:p>
-          <a:p>
+              <a:t>Environmental </a:t>
+            </a:r>
             <a:r>
               <a:rPr lang="en-US" sz="2800" dirty="0" smtClean="0"/>
-              <a:t>Environmental awareness</a:t>
-            </a:r>
-          </a:p>
-          <a:p>
-            <a:r>
-              <a:rPr lang="en-US" sz="2800" dirty="0" err="1" smtClean="0"/>
-              <a:t>Crowdfunding</a:t>
+              <a:t>awareness</a:t>
+            </a:r>
+          </a:p>
+          <a:p>
+            <a:r>
+              <a:rPr lang="en-US" sz="2800" dirty="0" smtClean="0"/>
+              <a:t>Kickstarter</a:t>
             </a:r>
             <a:endParaRPr lang="en-US" sz="2800" dirty="0" smtClean="0"/>
           </a:p>
           <a:p>
             <a:r>
               <a:rPr lang="en-US" sz="2800" dirty="0" smtClean="0"/>
-              <a:t>Technology and connectivity</a:t>
+              <a:t>Technology</a:t>
+            </a:r>
+          </a:p>
+          <a:p>
+            <a:pPr marL="0" indent="0">
+              <a:buNone/>
+            </a:pPr>
+            <a:r>
+              <a:rPr lang="en-US" sz="2800" dirty="0"/>
+              <a:t>	</a:t>
+            </a:r>
+            <a:r>
+              <a:rPr lang="en-US" sz="2800" dirty="0" smtClean="0"/>
+              <a:t>-Social Networks</a:t>
             </a:r>
             <a:endParaRPr lang="en-US" sz="2800" dirty="0"/>
           </a:p>
@@ -3754,14 +5167,9 @@
           <a:p>
             <a:r>
               <a:rPr lang="en-US" sz="2800" dirty="0" smtClean="0"/>
-              <a:t>Health concerns</a:t>
-            </a:r>
-          </a:p>
-          <a:p>
-            <a:r>
-              <a:rPr lang="en-US" sz="2800" dirty="0" smtClean="0"/>
-              <a:t>Young children</a:t>
-            </a:r>
+              <a:t>Health Concerns</a:t>
+            </a:r>
+            <a:endParaRPr lang="en-US" sz="2800" dirty="0" smtClean="0"/>
           </a:p>
           <a:p>
             <a:r>
@@ -3780,6 +5188,86 @@
               <a:buNone/>
             </a:pPr>
             <a:endParaRPr lang="en-US" dirty="0"/>
+          </a:p>
+        </p:txBody>
+      </p:sp>
+      <p:sp>
+        <p:nvSpPr>
+          <p:cNvPr id="7" name="Oval 6"/>
+          <p:cNvSpPr/>
+          <p:nvPr/>
+        </p:nvSpPr>
+        <p:spPr>
+          <a:xfrm>
+            <a:off x="76200" y="104776"/>
+            <a:ext cx="228600" cy="276224"/>
+          </a:xfrm>
+          <a:prstGeom prst="ellipse">
+            <a:avLst/>
+          </a:prstGeom>
+        </p:spPr>
+        <p:style>
+          <a:lnRef idx="2">
+            <a:schemeClr val="accent1">
+              <a:shade val="50000"/>
+            </a:schemeClr>
+          </a:lnRef>
+          <a:fillRef idx="1">
+            <a:schemeClr val="accent1"/>
+          </a:fillRef>
+          <a:effectRef idx="0">
+            <a:schemeClr val="accent1"/>
+          </a:effectRef>
+          <a:fontRef idx="minor">
+            <a:schemeClr val="lt1"/>
+          </a:fontRef>
+        </p:style>
+        <p:txBody>
+          <a:bodyPr rtlCol="0" anchor="ctr"/>
+          <a:lstStyle/>
+          <a:p>
+            <a:pPr algn="ctr"/>
+            <a:endParaRPr lang="en-US"/>
+          </a:p>
+        </p:txBody>
+      </p:sp>
+      <p:sp>
+        <p:nvSpPr>
+          <p:cNvPr id="8" name="Rectangle 7"/>
+          <p:cNvSpPr/>
+          <p:nvPr/>
+        </p:nvSpPr>
+        <p:spPr>
+          <a:xfrm>
+            <a:off x="8915399" y="104776"/>
+            <a:ext cx="180975" cy="169862"/>
+          </a:xfrm>
+          <a:prstGeom prst="rect">
+            <a:avLst/>
+          </a:prstGeom>
+        </p:spPr>
+        <p:style>
+          <a:lnRef idx="2">
+            <a:schemeClr val="dk1">
+              <a:shade val="50000"/>
+            </a:schemeClr>
+          </a:lnRef>
+          <a:fillRef idx="1">
+            <a:schemeClr val="dk1"/>
+          </a:fillRef>
+          <a:effectRef idx="0">
+            <a:schemeClr val="dk1"/>
+          </a:effectRef>
+          <a:fontRef idx="minor">
+            <a:schemeClr val="lt1"/>
+          </a:fontRef>
+        </p:style>
+        <p:txBody>
+          <a:bodyPr rtlCol="0" anchor="ctr"/>
+          <a:lstStyle/>
+          <a:p>
+            <a:pPr algn="ctr"/>
+            <a:endParaRPr lang="en-US"/>
           </a:p>
         </p:txBody>
       </p:sp>
@@ -3838,10 +5326,14 @@
           <a:lstStyle/>
           <a:p>
             <a:r>
-              <a:rPr lang="en-US" sz="6000" dirty="0" smtClean="0"/>
+              <a:rPr lang="en-US" sz="6000" dirty="0" smtClean="0">
+                <a:latin typeface="+mn-lt"/>
+              </a:rPr>
               <a:t>Acquiring Data </a:t>
             </a:r>
-            <a:endParaRPr lang="en-US" sz="6000" dirty="0"/>
+            <a:endParaRPr lang="en-US" sz="6000" dirty="0">
+              <a:latin typeface="+mn-lt"/>
+            </a:endParaRPr>
           </a:p>
         </p:txBody>
       </p:sp>
@@ -3859,6 +5351,13 @@
         <p:txBody>
           <a:bodyPr/>
           <a:lstStyle/>
+          <a:p>
+            <a:r>
+              <a:rPr lang="en-US" sz="4400" dirty="0" smtClean="0"/>
+              <a:t>Website</a:t>
+            </a:r>
+            <a:endParaRPr lang="en-US" sz="4400" dirty="0" smtClean="0"/>
+          </a:p>
           <a:p>
             <a:r>
               <a:rPr lang="en-US" sz="4400" dirty="0" smtClean="0"/>
@@ -3868,21 +5367,9 @@
           <a:p>
             <a:r>
               <a:rPr lang="en-US" sz="4400" dirty="0" smtClean="0"/>
-              <a:t>Website, online beta</a:t>
-            </a:r>
-          </a:p>
-          <a:p>
-            <a:r>
-              <a:rPr lang="en-US" sz="4400" dirty="0" smtClean="0"/>
-              <a:t>Email list</a:t>
-            </a:r>
-          </a:p>
-          <a:p>
-            <a:pPr lvl="1"/>
-            <a:r>
-              <a:rPr lang="en-US" sz="3600" dirty="0" smtClean="0"/>
               <a:t>Questionnaire</a:t>
             </a:r>
+            <a:endParaRPr lang="en-US" sz="4400" dirty="0" smtClean="0"/>
           </a:p>
           <a:p>
             <a:pPr lvl="1"/>
@@ -3905,6 +5392,46 @@
           </a:p>
           <a:p>
             <a:endParaRPr lang="en-US" dirty="0"/>
+          </a:p>
+        </p:txBody>
+      </p:sp>
+      <p:sp>
+        <p:nvSpPr>
+          <p:cNvPr id="5" name="Rectangle 4"/>
+          <p:cNvSpPr/>
+          <p:nvPr/>
+        </p:nvSpPr>
+        <p:spPr>
+          <a:xfrm>
+            <a:off x="8686800" y="246063"/>
+            <a:ext cx="228600" cy="287337"/>
+          </a:xfrm>
+          <a:prstGeom prst="rect">
+            <a:avLst/>
+          </a:prstGeom>
+        </p:spPr>
+        <p:style>
+          <a:lnRef idx="2">
+            <a:schemeClr val="dk1">
+              <a:shade val="50000"/>
+            </a:schemeClr>
+          </a:lnRef>
+          <a:fillRef idx="1">
+            <a:schemeClr val="dk1"/>
+          </a:fillRef>
+          <a:effectRef idx="0">
+            <a:schemeClr val="dk1"/>
+          </a:effectRef>
+          <a:fontRef idx="minor">
+            <a:schemeClr val="lt1"/>
+          </a:fontRef>
+        </p:style>
+        <p:txBody>
+          <a:bodyPr rtlCol="0" anchor="ctr"/>
+          <a:lstStyle/>
+          <a:p>
+            <a:pPr algn="ctr"/>
+            <a:endParaRPr lang="en-US"/>
           </a:p>
         </p:txBody>
       </p:sp>
@@ -3961,10 +5488,14 @@
           <a:lstStyle/>
           <a:p>
             <a:r>
-              <a:rPr lang="en-US" dirty="0" smtClean="0"/>
+              <a:rPr lang="en-US" dirty="0" smtClean="0">
+                <a:latin typeface="+mn-lt"/>
+              </a:rPr>
               <a:t>Responses</a:t>
             </a:r>
-            <a:endParaRPr lang="en-US" dirty="0"/>
+            <a:endParaRPr lang="en-US" dirty="0">
+              <a:latin typeface="+mn-lt"/>
+            </a:endParaRPr>
           </a:p>
         </p:txBody>
       </p:sp>
@@ -3977,7 +5508,7 @@
           <p:nvPr/>
         </p:nvPicPr>
         <p:blipFill>
-          <a:blip r:embed="rId2">
+          <a:blip r:embed="rId3">
             <a:extLst>
               <a:ext uri="{28A0092B-C50C-407E-A947-70E740481C1C}">
                 <a14:useLocalDpi xmlns:a14="http://schemas.microsoft.com/office/drawing/2010/main" val="0"/>
@@ -4032,6 +5563,46 @@
           </a:extLst>
         </p:spPr>
       </p:pic>
+      <p:sp>
+        <p:nvSpPr>
+          <p:cNvPr id="3" name="Oval 2"/>
+          <p:cNvSpPr/>
+          <p:nvPr/>
+        </p:nvSpPr>
+        <p:spPr>
+          <a:xfrm>
+            <a:off x="8610600" y="274638"/>
+            <a:ext cx="228600" cy="258762"/>
+          </a:xfrm>
+          <a:prstGeom prst="ellipse">
+            <a:avLst/>
+          </a:prstGeom>
+        </p:spPr>
+        <p:style>
+          <a:lnRef idx="2">
+            <a:schemeClr val="accent1">
+              <a:shade val="50000"/>
+            </a:schemeClr>
+          </a:lnRef>
+          <a:fillRef idx="1">
+            <a:schemeClr val="accent1"/>
+          </a:fillRef>
+          <a:effectRef idx="0">
+            <a:schemeClr val="accent1"/>
+          </a:effectRef>
+          <a:fontRef idx="minor">
+            <a:schemeClr val="lt1"/>
+          </a:fontRef>
+        </p:style>
+        <p:txBody>
+          <a:bodyPr rtlCol="0" anchor="ctr"/>
+          <a:lstStyle/>
+          <a:p>
+            <a:pPr algn="ctr"/>
+            <a:endParaRPr lang="en-US"/>
+          </a:p>
+        </p:txBody>
+      </p:sp>
     </p:spTree>
     <p:extLst>
       <p:ext uri="{BB962C8B-B14F-4D97-AF65-F5344CB8AC3E}">
@@ -4085,54 +5656,104 @@
           <a:lstStyle/>
           <a:p>
             <a:r>
-              <a:rPr lang="en-US" dirty="0" smtClean="0"/>
-              <a:t>More Feedback</a:t>
-            </a:r>
+              <a:rPr lang="en-US" dirty="0" smtClean="0">
+                <a:latin typeface="+mn-lt"/>
+              </a:rPr>
+              <a:t>Beta Analysis</a:t>
+            </a:r>
+            <a:endParaRPr lang="en-US" dirty="0">
+              <a:latin typeface="+mn-lt"/>
+            </a:endParaRPr>
+          </a:p>
+        </p:txBody>
+      </p:sp>
+      <p:sp>
+        <p:nvSpPr>
+          <p:cNvPr id="3" name="Content Placeholder 2"/>
+          <p:cNvSpPr>
+            <a:spLocks noGrp="1"/>
+          </p:cNvSpPr>
+          <p:nvPr>
+            <p:ph idx="1"/>
+          </p:nvPr>
+        </p:nvSpPr>
+        <p:spPr/>
+        <p:txBody>
+          <a:bodyPr/>
+          <a:lstStyle/>
+          <a:p>
+            <a:r>
+              <a:rPr lang="en-US" sz="4800" dirty="0" smtClean="0"/>
+              <a:t>Add-on solution instead of full </a:t>
+            </a:r>
+            <a:r>
+              <a:rPr lang="en-US" sz="4800" dirty="0" smtClean="0"/>
+              <a:t>faucet</a:t>
+            </a:r>
+            <a:endParaRPr lang="en-US" sz="4800" dirty="0" smtClean="0"/>
+          </a:p>
+          <a:p>
+            <a:r>
+              <a:rPr lang="en-US" sz="4800" dirty="0" smtClean="0"/>
+              <a:t>Confidence in city </a:t>
+            </a:r>
+            <a:r>
+              <a:rPr lang="en-US" sz="4800" dirty="0" smtClean="0"/>
+              <a:t>water</a:t>
+            </a:r>
+          </a:p>
+          <a:p>
+            <a:r>
+              <a:rPr lang="en-US" sz="4800" dirty="0" smtClean="0"/>
+              <a:t>Cheap</a:t>
+            </a:r>
+            <a:endParaRPr lang="en-US" sz="4800" dirty="0" smtClean="0"/>
+          </a:p>
+          <a:p>
+            <a:endParaRPr lang="en-US" dirty="0" smtClean="0"/>
+          </a:p>
+          <a:p>
             <a:endParaRPr lang="en-US" dirty="0"/>
           </a:p>
         </p:txBody>
       </p:sp>
       <p:sp>
         <p:nvSpPr>
-          <p:cNvPr id="3" name="Content Placeholder 2"/>
-          <p:cNvSpPr>
-            <a:spLocks noGrp="1"/>
-          </p:cNvSpPr>
-          <p:nvPr>
-            <p:ph idx="1"/>
-          </p:nvPr>
-        </p:nvSpPr>
-        <p:spPr/>
-        <p:txBody>
-          <a:bodyPr/>
-          <a:lstStyle/>
-          <a:p>
-            <a:r>
-              <a:rPr lang="en-US" sz="4800" dirty="0" smtClean="0"/>
-              <a:t>Add-on solution instead of full faucet</a:t>
-            </a:r>
-          </a:p>
-          <a:p>
-            <a:r>
-              <a:rPr lang="en-US" sz="4800" dirty="0" err="1" smtClean="0"/>
-              <a:t>Aperio</a:t>
-            </a:r>
-            <a:r>
-              <a:rPr lang="en-US" sz="4800" dirty="0" smtClean="0"/>
-              <a:t> vs. filter</a:t>
-            </a:r>
-          </a:p>
-          <a:p>
-            <a:r>
-              <a:rPr lang="en-US" sz="4800" dirty="0" smtClean="0"/>
-              <a:t>Confidence in city water</a:t>
-            </a:r>
-          </a:p>
-          <a:p>
-            <a:endParaRPr lang="en-US" dirty="0" smtClean="0"/>
-          </a:p>
-          <a:p>
-            <a:endParaRPr lang="en-US" dirty="0"/>
+          <p:cNvPr id="4" name="Oval 3"/>
+          <p:cNvSpPr/>
+          <p:nvPr/>
+        </p:nvSpPr>
+        <p:spPr>
+          <a:xfrm>
+            <a:off x="8686800" y="274638"/>
+            <a:ext cx="228600" cy="258762"/>
+          </a:xfrm>
+          <a:prstGeom prst="ellipse">
+            <a:avLst/>
+          </a:prstGeom>
+        </p:spPr>
+        <p:style>
+          <a:lnRef idx="2">
+            <a:schemeClr val="accent1">
+              <a:shade val="50000"/>
+            </a:schemeClr>
+          </a:lnRef>
+          <a:fillRef idx="1">
+            <a:schemeClr val="accent1"/>
+          </a:fillRef>
+          <a:effectRef idx="0">
+            <a:schemeClr val="accent1"/>
+          </a:effectRef>
+          <a:fontRef idx="minor">
+            <a:schemeClr val="lt1"/>
+          </a:fontRef>
+        </p:style>
+        <p:txBody>
+          <a:bodyPr rtlCol="0" anchor="ctr"/>
+          <a:lstStyle/>
+          <a:p>
+            <a:pPr algn="ctr"/>
+            <a:endParaRPr lang="en-US"/>
           </a:p>
         </p:txBody>
       </p:sp>
@@ -4191,10 +5812,20 @@
           <a:lstStyle/>
           <a:p>
             <a:r>
-              <a:rPr lang="en-US" sz="6000" dirty="0" smtClean="0"/>
-              <a:t>Application of Data</a:t>
-            </a:r>
-            <a:endParaRPr lang="en-US" sz="6000" dirty="0"/>
+              <a:rPr lang="en-US" sz="6000" dirty="0" smtClean="0">
+                <a:latin typeface="+mn-lt"/>
+              </a:rPr>
+              <a:t>Application of </a:t>
+            </a:r>
+            <a:r>
+              <a:rPr lang="en-US" sz="6000" dirty="0" smtClean="0">
+                <a:latin typeface="+mn-lt"/>
+              </a:rPr>
+              <a:t>Analysis</a:t>
+            </a:r>
+            <a:endParaRPr lang="en-US" sz="6000" dirty="0">
+              <a:latin typeface="+mn-lt"/>
+            </a:endParaRPr>
           </a:p>
         </p:txBody>
       </p:sp>
@@ -4219,20 +5850,91 @@
             </a:r>
             <a:r>
               <a:rPr lang="en-US" dirty="0" smtClean="0"/>
-              <a:t> Micro</a:t>
-            </a:r>
-          </a:p>
-          <a:p>
+              <a:t> </a:t>
+            </a:r>
             <a:r>
               <a:rPr lang="en-US" dirty="0" smtClean="0"/>
-              <a:t>Sensor Priority List</a:t>
-            </a:r>
-          </a:p>
-          <a:p>
+              <a:t>Micro</a:t>
+            </a:r>
+          </a:p>
+          <a:p>
+            <a:r>
+              <a:rPr lang="en-US" dirty="0" smtClean="0"/>
+              <a:t>Sensor </a:t>
+            </a:r>
+            <a:r>
+              <a:rPr lang="en-US" dirty="0" smtClean="0"/>
+              <a:t>Priority </a:t>
+            </a:r>
+            <a:r>
+              <a:rPr lang="en-US" dirty="0" smtClean="0"/>
+              <a:t>List</a:t>
+            </a:r>
+          </a:p>
+          <a:p>
+            <a:r>
+              <a:rPr lang="en-US" dirty="0" smtClean="0"/>
+              <a:t>Top Water Utilities</a:t>
+            </a:r>
+          </a:p>
+          <a:p>
+            <a:r>
+              <a:rPr lang="en-US" dirty="0" smtClean="0"/>
+              <a:t>Cost-efficient</a:t>
+            </a:r>
+          </a:p>
+          <a:p>
+            <a:r>
+              <a:rPr lang="en-US" dirty="0" smtClean="0"/>
+              <a:t>Continue the project</a:t>
+            </a:r>
             <a:endParaRPr lang="en-US" dirty="0" smtClean="0"/>
           </a:p>
           <a:p>
+            <a:endParaRPr lang="en-US" dirty="0" smtClean="0"/>
+          </a:p>
+          <a:p>
             <a:endParaRPr lang="en-US" dirty="0"/>
+          </a:p>
+        </p:txBody>
+      </p:sp>
+      <p:sp>
+        <p:nvSpPr>
+          <p:cNvPr id="4" name="Rectangle 3"/>
+          <p:cNvSpPr/>
+          <p:nvPr/>
+        </p:nvSpPr>
+        <p:spPr>
+          <a:xfrm>
+            <a:off x="8763000" y="274638"/>
+            <a:ext cx="228600" cy="258762"/>
+          </a:xfrm>
+          <a:prstGeom prst="rect">
+            <a:avLst/>
+          </a:prstGeom>
+        </p:spPr>
+        <p:style>
+          <a:lnRef idx="2">
+            <a:schemeClr val="dk1">
+              <a:shade val="50000"/>
+            </a:schemeClr>
+          </a:lnRef>
+          <a:fillRef idx="1">
+            <a:schemeClr val="dk1"/>
+          </a:fillRef>
+          <a:effectRef idx="0">
+            <a:schemeClr val="dk1"/>
+          </a:effectRef>
+          <a:fontRef idx="minor">
+            <a:schemeClr val="lt1"/>
+          </a:fontRef>
+        </p:style>
+        <p:txBody>
+          <a:bodyPr rtlCol="0" anchor="ctr"/>
+          <a:lstStyle/>
+          <a:p>
+            <a:pPr algn="ctr"/>
+            <a:endParaRPr lang="en-US"/>
           </a:p>
         </p:txBody>
       </p:sp>
@@ -4479,4 +6181,265 @@
   <a:objectDefaults/>
   <a:extraClrSchemeLst/>
 </a:theme>
+</file>
+
+<file path=ppt/theme/theme2.xml><?xml version="1.0" encoding="utf-8"?>
+<a:theme xmlns:a="http://schemas.openxmlformats.org/drawingml/2006/main" name="Office Theme">
+  <a:themeElements>
+    <a:clrScheme name="Office">
+      <a:dk1>
+        <a:sysClr val="windowText" lastClr="000000"/>
+      </a:dk1>
+      <a:lt1>
+        <a:sysClr val="window" lastClr="FFFFFF"/>
+      </a:lt1>
+      <a:dk2>
+        <a:srgbClr val="44546A"/>
+      </a:dk2>
+      <a:lt2>
+        <a:srgbClr val="E7E6E6"/>
+      </a:lt2>
+      <a:accent1>
+        <a:srgbClr val="5B9BD5"/>
+      </a:accent1>
+      <a:accent2>
+        <a:srgbClr val="ED7D31"/>
+      </a:accent2>
+      <a:accent3>
+        <a:srgbClr val="A5A5A5"/>
+      </a:accent3>
+      <a:accent4>
+        <a:srgbClr val="FFC000"/>
+      </a:accent4>
+      <a:accent5>
+        <a:srgbClr val="4472C4"/>
+      </a:accent5>
+      <a:accent6>
+        <a:srgbClr val="70AD47"/>
+      </a:accent6>
+      <a:hlink>
+        <a:srgbClr val="0563C1"/>
+      </a:hlink>
+      <a:folHlink>
+        <a:srgbClr val="954F72"/>
+      </a:folHlink>
+    </a:clrScheme>
+    <a:fontScheme name="Office">
+      <a:majorFont>
+        <a:latin typeface="Calibri Light" panose="020F0302020204030204"/>
+        <a:ea typeface=""/>
+        <a:cs typeface=""/>
+        <a:font script="Jpan" typeface="ＭＳ Ｐゴシック"/>
+        <a:font script="Hang" typeface="맑은 고딕"/>
+        <a:font script="Hans" typeface="宋体"/>
+        <a:font script="Hant" typeface="新細明體"/>
+        <a:font script="Arab" typeface="Times New Roman"/>
+        <a:font script="Hebr" typeface="Times New Roman"/>
+        <a:font script="Thai" typeface="Angsana New"/>
+        <a:font script="Ethi" typeface="Nyala"/>
+        <a:font script="Beng" typeface="Vrinda"/>
+        <a:font script="Gujr" typeface="Shruti"/>
+        <a:font script="Khmr" typeface="MoolBoran"/>
+        <a:font script="Knda" typeface="Tunga"/>
+        <a:font script="Guru" typeface="Raavi"/>
+        <a:font script="Cans" typeface="Euphemia"/>
+        <a:font script="Cher" typeface="Plantagenet Cherokee"/>
+        <a:font script="Yiii" typeface="Microsoft Yi Baiti"/>
+        <a:font script="Tibt" typeface="Microsoft Himalaya"/>
+        <a:font script="Thaa" typeface="MV Boli"/>
+        <a:font script="Deva" typeface="Mangal"/>
+        <a:font script="Telu" typeface="Gautami"/>
+        <a:font script="Taml" typeface="Latha"/>
+        <a:font script="Syrc" typeface="Estrangelo Edessa"/>
+        <a:font script="Orya" typeface="Kalinga"/>
+        <a:font script="Mlym" typeface="Kartika"/>
+        <a:font script="Laoo" typeface="DokChampa"/>
+        <a:font script="Sinh" typeface="Iskoola Pota"/>
+        <a:font script="Mong" typeface="Mongolian Baiti"/>
+        <a:font script="Viet" typeface="Times New Roman"/>
+        <a:font script="Uigh" typeface="Microsoft Uighur"/>
+        <a:font script="Geor" typeface="Sylfaen"/>
+      </a:majorFont>
+      <a:minorFont>
+        <a:latin typeface="Calibri" panose="020F0502020204030204"/>
+        <a:ea typeface=""/>
+        <a:cs typeface=""/>
+        <a:font script="Jpan" typeface="ＭＳ Ｐゴシック"/>
+        <a:font script="Hang" typeface="맑은 고딕"/>
+        <a:font script="Hans" typeface="宋体"/>
+        <a:font script="Hant" typeface="新細明體"/>
+        <a:font script="Arab" typeface="Arial"/>
+        <a:font script="Hebr" typeface="Arial"/>
+        <a:font script="Thai" typeface="Cordia New"/>
+        <a:font script="Ethi" typeface="Nyala"/>
+        <a:font script="Beng" typeface="Vrinda"/>
+        <a:font script="Gujr" typeface="Shruti"/>
+        <a:font script="Khmr" typeface="DaunPenh"/>
+        <a:font script="Knda" typeface="Tunga"/>
+        <a:font script="Guru" typeface="Raavi"/>
+        <a:font script="Cans" typeface="Euphemia"/>
+        <a:font script="Cher" typeface="Plantagenet Cherokee"/>
+        <a:font script="Yiii" typeface="Microsoft Yi Baiti"/>
+        <a:font script="Tibt" typeface="Microsoft Himalaya"/>
+        <a:font script="Thaa" typeface="MV Boli"/>
+        <a:font script="Deva" typeface="Mangal"/>
+        <a:font script="Telu" typeface="Gautami"/>
+        <a:font script="Taml" typeface="Latha"/>
+        <a:font script="Syrc" typeface="Estrangelo Edessa"/>
+        <a:font script="Orya" typeface="Kalinga"/>
+        <a:font script="Mlym" typeface="Kartika"/>
+        <a:font script="Laoo" typeface="DokChampa"/>
+        <a:font script="Sinh" typeface="Iskoola Pota"/>
+        <a:font script="Mong" typeface="Mongolian Baiti"/>
+        <a:font script="Viet" typeface="Arial"/>
+        <a:font script="Uigh" typeface="Microsoft Uighur"/>
+        <a:font script="Geor" typeface="Sylfaen"/>
+      </a:minorFont>
+    </a:fontScheme>
+    <a:fmtScheme name="Office">
+      <a:fillStyleLst>
+        <a:solidFill>
+          <a:schemeClr val="phClr"/>
+        </a:solidFill>
+        <a:gradFill rotWithShape="1">
+          <a:gsLst>
+            <a:gs pos="0">
+              <a:schemeClr val="phClr">
+                <a:lumMod val="110000"/>
+                <a:satMod val="105000"/>
+                <a:tint val="67000"/>
+              </a:schemeClr>
+            </a:gs>
+            <a:gs pos="50000">
+              <a:schemeClr val="phClr">
+                <a:lumMod val="105000"/>
+                <a:satMod val="103000"/>
+                <a:tint val="73000"/>
+              </a:schemeClr>
+            </a:gs>
+            <a:gs pos="100000">
+              <a:schemeClr val="phClr">
+                <a:lumMod val="105000"/>
+                <a:satMod val="109000"/>
+                <a:tint val="81000"/>
+              </a:schemeClr>
+            </a:gs>
+          </a:gsLst>
+          <a:lin ang="5400000" scaled="0"/>
+        </a:gradFill>
+        <a:gradFill rotWithShape="1">
+          <a:gsLst>
+            <a:gs pos="0">
+              <a:schemeClr val="phClr">
+                <a:satMod val="103000"/>
+                <a:lumMod val="102000"/>
+                <a:tint val="94000"/>
+              </a:schemeClr>
+            </a:gs>
+            <a:gs pos="50000">
+              <a:schemeClr val="phClr">
+                <a:satMod val="110000"/>
+                <a:lumMod val="100000"/>
+                <a:shade val="100000"/>
+              </a:schemeClr>
+            </a:gs>
+            <a:gs pos="100000">
+              <a:schemeClr val="phClr">
+                <a:lumMod val="99000"/>
+                <a:satMod val="120000"/>
+                <a:shade val="78000"/>
+              </a:schemeClr>
+            </a:gs>
+          </a:gsLst>
+          <a:lin ang="5400000" scaled="0"/>
+        </a:gradFill>
+      </a:fillStyleLst>
+      <a:lnStyleLst>
+        <a:ln w="6350" cap="flat" cmpd="sng" algn="ctr">
+          <a:solidFill>
+            <a:schemeClr val="phClr"/>
+          </a:solidFill>
+          <a:prstDash val="solid"/>
+          <a:miter lim="800000"/>
+        </a:ln>
+        <a:ln w="12700" cap="flat" cmpd="sng" algn="ctr">
+          <a:solidFill>
+            <a:schemeClr val="phClr"/>
+          </a:solidFill>
+          <a:prstDash val="solid"/>
+          <a:miter lim="800000"/>
+        </a:ln>
+        <a:ln w="19050" cap="flat" cmpd="sng" algn="ctr">
+          <a:solidFill>
+            <a:schemeClr val="phClr"/>
+          </a:solidFill>
+          <a:prstDash val="solid"/>
+          <a:miter lim="800000"/>
+        </a:ln>
+      </a:lnStyleLst>
+      <a:effectStyleLst>
+        <a:effectStyle>
+          <a:effectLst/>
+        </a:effectStyle>
+        <a:effectStyle>
+          <a:effectLst/>
+        </a:effectStyle>
+        <a:effectStyle>
+          <a:effectLst>
+            <a:outerShdw blurRad="57150" dist="19050" dir="5400000" algn="ctr" rotWithShape="0">
+              <a:srgbClr val="000000">
+                <a:alpha val="63000"/>
+              </a:srgbClr>
+            </a:outerShdw>
+          </a:effectLst>
+        </a:effectStyle>
+      </a:effectStyleLst>
+      <a:bgFillStyleLst>
+        <a:solidFill>
+          <a:schemeClr val="phClr"/>
+        </a:solidFill>
+        <a:solidFill>
+          <a:schemeClr val="phClr">
+            <a:tint val="95000"/>
+            <a:satMod val="170000"/>
+          </a:schemeClr>
+        </a:solidFill>
+        <a:gradFill rotWithShape="1">
+          <a:gsLst>
+            <a:gs pos="0">
+              <a:schemeClr val="phClr">
+                <a:tint val="93000"/>
+                <a:satMod val="150000"/>
+                <a:shade val="98000"/>
+                <a:lumMod val="102000"/>
+              </a:schemeClr>
+            </a:gs>
+            <a:gs pos="50000">
+              <a:schemeClr val="phClr">
+                <a:tint val="98000"/>
+                <a:satMod val="130000"/>
+                <a:shade val="90000"/>
+                <a:lumMod val="103000"/>
+              </a:schemeClr>
+            </a:gs>
+            <a:gs pos="100000">
+              <a:schemeClr val="phClr">
+                <a:shade val="63000"/>
+                <a:satMod val="120000"/>
+              </a:schemeClr>
+            </a:gs>
+          </a:gsLst>
+          <a:lin ang="5400000" scaled="0"/>
+        </a:gradFill>
+      </a:bgFillStyleLst>
+    </a:fmtScheme>
+  </a:themeElements>
+  <a:objectDefaults/>
+  <a:extraClrSchemeLst/>
+  <a:extLst>
+    <a:ext uri="{05A4C25C-085E-4340-85A3-A5531E510DB2}">
+      <thm15:themeFamily xmlns:thm15="http://schemas.microsoft.com/office/thememl/2012/main" name="Office Theme" id="{62F939B6-93AF-4DB8-9C6B-D6C7DFDC589F}" vid="{4A3C46E8-61CC-4603-A589-7422A47A8E4A}"/>
+    </a:ext>
+  </a:extLst>
+</a:theme>
 </file>
</xml_diff>